<commit_message>
Added QR and updated group info on promotion slide
</commit_message>
<xml_diff>
--- a/virtual_meetup/Virtual.User.Group.Slides.pptx
+++ b/virtual_meetup/Virtual.User.Group.Slides.pptx
@@ -216,7 +216,7 @@
           <a:p>
             <a:fld id="{18438622-0837-4E9E-A16C-0B0206CE676E}" type="datetimeFigureOut">
               <a:rPr lang="en-US" smtClean="0"/>
-              <a:t>6/15/2020</a:t>
+              <a:t>2/15/2022</a:t>
             </a:fld>
             <a:endParaRPr lang="en-US"/>
           </a:p>
@@ -527,7 +527,7 @@
           <a:bodyPr/>
           <a:lstStyle/>
           <a:p>
-            <a:endParaRPr lang="en-US"/>
+            <a:endParaRPr lang="en-US" dirty="0"/>
           </a:p>
         </p:txBody>
       </p:sp>
@@ -1354,7 +1354,7 @@
           <a:p>
             <a:fld id="{2CB4FCFF-7E08-4891-89FE-DF4B4567C4DE}" type="datetimeFigureOut">
               <a:rPr lang="en-US" smtClean="0"/>
-              <a:t>6/15/2020</a:t>
+              <a:t>2/15/2022</a:t>
             </a:fld>
             <a:endParaRPr lang="en-US"/>
           </a:p>
@@ -4890,6 +4890,13 @@
   <p:transition>
     <p:fade/>
   </p:transition>
+  <p:timing>
+    <p:tnLst>
+      <p:par>
+        <p:cTn id="1" dur="indefinite" restart="never" nodeType="tmRoot"/>
+      </p:par>
+    </p:tnLst>
+  </p:timing>
 </p:sld>
 </file>
 
@@ -4926,11 +4933,17 @@
             <p:ph type="title"/>
           </p:nvPr>
         </p:nvSpPr>
-        <p:spPr/>
+        <p:spPr>
+          <a:xfrm>
+            <a:off x="1628140" y="230376"/>
+            <a:ext cx="8976360" cy="899665"/>
+          </a:xfrm>
+        </p:spPr>
         <p:txBody>
           <a:bodyPr/>
           <a:lstStyle/>
           <a:p>
+            <a:pPr algn="ctr"/>
             <a:r>
               <a:rPr lang="en-US" dirty="0"/>
               <a:t>.NET Foundation Virtual User Group</a:t>
@@ -4983,119 +4996,155 @@
           </a:p>
         </p:txBody>
       </p:sp>
-      <p:grpSp>
-        <p:nvGrpSpPr>
-          <p:cNvPr id="11" name="Group 10">
+      <p:sp>
+        <p:nvSpPr>
+          <p:cNvPr id="9" name="TextBox 8">
             <a:extLst>
               <a:ext uri="{FF2B5EF4-FFF2-40B4-BE49-F238E27FC236}">
-                <a16:creationId xmlns:a16="http://schemas.microsoft.com/office/drawing/2014/main" id="{B210E1BE-6F7F-4D04-A5CC-45EB96F80AF7}"/>
+                <a16:creationId xmlns:a16="http://schemas.microsoft.com/office/drawing/2014/main" id="{06D0076F-A3C2-49BC-AD15-176C795D910B}"/>
               </a:ext>
             </a:extLst>
           </p:cNvPr>
-          <p:cNvGrpSpPr/>
+          <p:cNvSpPr txBox="1"/>
           <p:nvPr/>
-        </p:nvGrpSpPr>
-        <p:grpSpPr>
+        </p:nvSpPr>
+        <p:spPr>
           <a:xfrm>
-            <a:off x="2165722" y="2207172"/>
-            <a:ext cx="9464670" cy="4007724"/>
-            <a:chOff x="392256" y="1313872"/>
-            <a:chExt cx="7890732" cy="3341255"/>
+            <a:off x="6590581" y="5149644"/>
+            <a:ext cx="5516534" cy="461665"/>
           </a:xfrm>
-        </p:grpSpPr>
-        <p:pic>
-          <p:nvPicPr>
-            <p:cNvPr id="7" name="Picture 6">
-              <a:extLst>
-                <a:ext uri="{FF2B5EF4-FFF2-40B4-BE49-F238E27FC236}">
-                  <a16:creationId xmlns:a16="http://schemas.microsoft.com/office/drawing/2014/main" id="{F61C6565-4685-48C8-9C43-B8A4E6C34926}"/>
-                </a:ext>
-              </a:extLst>
-            </p:cNvPr>
-            <p:cNvPicPr>
-              <a:picLocks noChangeAspect="1"/>
-            </p:cNvPicPr>
-            <p:nvPr/>
-          </p:nvPicPr>
-          <p:blipFill>
-            <a:blip r:embed="rId3"/>
-            <a:stretch>
-              <a:fillRect/>
-            </a:stretch>
-          </p:blipFill>
-          <p:spPr>
-            <a:xfrm>
-              <a:off x="392256" y="1313872"/>
-              <a:ext cx="7890732" cy="3341255"/>
-            </a:xfrm>
-            <a:prstGeom prst="rect">
-              <a:avLst/>
-            </a:prstGeom>
-            <a:ln w="19050">
+          <a:prstGeom prst="rect">
+            <a:avLst/>
+          </a:prstGeom>
+          <a:solidFill>
+            <a:schemeClr val="tx2"/>
+          </a:solidFill>
+          <a:ln>
+            <a:solidFill>
+              <a:schemeClr val="bg1"/>
+            </a:solidFill>
+          </a:ln>
+        </p:spPr>
+        <p:txBody>
+          <a:bodyPr wrap="square">
+            <a:spAutoFit/>
+          </a:bodyPr>
+          <a:lstStyle/>
+          <a:p>
+            <a:pPr algn="ctr"/>
+            <a:r>
+              <a:rPr lang="en-US" sz="2400" dirty="0">
+                <a:solidFill>
+                  <a:schemeClr val="bg1"/>
+                </a:solidFill>
+              </a:rPr>
+              <a:t>meetup.com/</a:t>
+            </a:r>
+            <a:r>
+              <a:rPr lang="en-US" sz="2400" dirty="0" err="1">
+                <a:solidFill>
+                  <a:schemeClr val="bg1"/>
+                </a:solidFill>
+              </a:rPr>
+              <a:t>dotnet</a:t>
+            </a:r>
+            <a:r>
+              <a:rPr lang="en-US" sz="2400" dirty="0">
+                <a:solidFill>
+                  <a:schemeClr val="bg1"/>
+                </a:solidFill>
+              </a:rPr>
+              <a:t>-virtual-user-group</a:t>
+            </a:r>
+            <a:endParaRPr lang="en-US" sz="2400" dirty="0">
               <a:solidFill>
-                <a:schemeClr val="accent1">
-                  <a:lumMod val="20000"/>
-                  <a:lumOff val="80000"/>
-                </a:schemeClr>
+                <a:schemeClr val="bg1"/>
               </a:solidFill>
-            </a:ln>
-          </p:spPr>
-        </p:pic>
-        <p:sp>
-          <p:nvSpPr>
-            <p:cNvPr id="9" name="TextBox 8">
-              <a:extLst>
-                <a:ext uri="{FF2B5EF4-FFF2-40B4-BE49-F238E27FC236}">
-                  <a16:creationId xmlns:a16="http://schemas.microsoft.com/office/drawing/2014/main" id="{06D0076F-A3C2-49BC-AD15-176C795D910B}"/>
-                </a:ext>
-              </a:extLst>
-            </p:cNvPr>
-            <p:cNvSpPr txBox="1"/>
-            <p:nvPr/>
-          </p:nvSpPr>
-          <p:spPr>
-            <a:xfrm>
-              <a:off x="3432356" y="3837229"/>
-              <a:ext cx="4783546" cy="384892"/>
-            </a:xfrm>
-            <a:prstGeom prst="rect">
-              <a:avLst/>
-            </a:prstGeom>
-            <a:solidFill>
-              <a:schemeClr val="accent1">
-                <a:lumMod val="20000"/>
-                <a:lumOff val="80000"/>
-              </a:schemeClr>
-            </a:solidFill>
-            <a:ln>
-              <a:solidFill>
-                <a:schemeClr val="accent1">
-                  <a:lumMod val="20000"/>
-                  <a:lumOff val="80000"/>
-                </a:schemeClr>
-              </a:solidFill>
-            </a:ln>
-          </p:spPr>
-          <p:txBody>
-            <a:bodyPr wrap="square">
-              <a:spAutoFit/>
-            </a:bodyPr>
-            <a:lstStyle/>
-            <a:p>
-              <a:r>
-                <a:rPr lang="en-US" sz="2400" dirty="0">
-                  <a:hlinkClick r:id="rId4"/>
-                </a:rPr>
-                <a:t>meetup.com/dotnet-virtual-user-group</a:t>
-              </a:r>
-              <a:endParaRPr lang="en-US" sz="2400" dirty="0"/>
-            </a:p>
-          </p:txBody>
-        </p:sp>
-      </p:grpSp>
+            </a:endParaRPr>
+          </a:p>
+        </p:txBody>
+      </p:sp>
+      <p:pic>
+        <p:nvPicPr>
+          <p:cNvPr id="6" name="Picture 5"/>
+          <p:cNvPicPr>
+            <a:picLocks noChangeAspect="1"/>
+          </p:cNvPicPr>
+          <p:nvPr/>
+        </p:nvPicPr>
+        <p:blipFill>
+          <a:blip r:embed="rId3" cstate="hqprint">
+            <a:extLst>
+              <a:ext uri="{28A0092B-C50C-407E-A947-70E740481C1C}">
+                <a14:useLocalDpi xmlns:a14="http://schemas.microsoft.com/office/drawing/2010/main" val="0"/>
+              </a:ext>
+            </a:extLst>
+          </a:blip>
+          <a:stretch>
+            <a:fillRect/>
+          </a:stretch>
+        </p:blipFill>
+        <p:spPr>
+          <a:xfrm>
+            <a:off x="8073551" y="2147974"/>
+            <a:ext cx="2280295" cy="2280295"/>
+          </a:xfrm>
+          <a:prstGeom prst="rect">
+            <a:avLst/>
+          </a:prstGeom>
+        </p:spPr>
+      </p:pic>
+      <p:pic>
+        <p:nvPicPr>
+          <p:cNvPr id="8" name="Picture 7"/>
+          <p:cNvPicPr>
+            <a:picLocks noChangeAspect="1"/>
+          </p:cNvPicPr>
+          <p:nvPr/>
+        </p:nvPicPr>
+        <p:blipFill>
+          <a:blip r:embed="rId4"/>
+          <a:stretch>
+            <a:fillRect/>
+          </a:stretch>
+        </p:blipFill>
+        <p:spPr>
+          <a:xfrm>
+            <a:off x="269240" y="1528257"/>
+            <a:ext cx="6134100" cy="5105400"/>
+          </a:xfrm>
+          <a:prstGeom prst="rect">
+            <a:avLst/>
+          </a:prstGeom>
+        </p:spPr>
+      </p:pic>
+      <p:pic>
+        <p:nvPicPr>
+          <p:cNvPr id="12" name="Picture 11"/>
+          <p:cNvPicPr>
+            <a:picLocks noChangeAspect="1"/>
+          </p:cNvPicPr>
+          <p:nvPr/>
+        </p:nvPicPr>
+        <p:blipFill>
+          <a:blip r:embed="rId5"/>
+          <a:stretch>
+            <a:fillRect/>
+          </a:stretch>
+        </p:blipFill>
+        <p:spPr>
+          <a:xfrm>
+            <a:off x="269240" y="1087254"/>
+            <a:ext cx="1247775" cy="542925"/>
+          </a:xfrm>
+          <a:prstGeom prst="rect">
+            <a:avLst/>
+          </a:prstGeom>
+        </p:spPr>
+      </p:pic>
       <p:sp>
         <p:nvSpPr>
-          <p:cNvPr id="10" name="TextBox 9">
+          <p:cNvPr id="13" name="TextBox 12">
             <a:extLst>
               <a:ext uri="{FF2B5EF4-FFF2-40B4-BE49-F238E27FC236}">
                 <a16:creationId xmlns:a16="http://schemas.microsoft.com/office/drawing/2014/main" id="{EA8FF4D3-8DA1-4A35-AF03-59E63C839C0B}"/>
@@ -5107,8 +5156,8 @@
         </p:nvSpPr>
         <p:spPr>
           <a:xfrm>
-            <a:off x="291500" y="1428109"/>
-            <a:ext cx="9230871" cy="627864"/>
+            <a:off x="2239792" y="875243"/>
+            <a:ext cx="7753055" cy="627864"/>
           </a:xfrm>
           <a:prstGeom prst="rect">
             <a:avLst/>
@@ -5121,15 +5170,13 @@
           </a:bodyPr>
           <a:lstStyle/>
           <a:p>
-            <a:pPr marL="342900" indent="-342900">
+            <a:pPr algn="ctr">
               <a:lnSpc>
                 <a:spcPct val="90000"/>
               </a:lnSpc>
               <a:spcAft>
                 <a:spcPts val="600"/>
               </a:spcAft>
-              <a:buFont typeface="Arial" panose="020B0604020202020204" pitchFamily="34" charset="0"/>
-              <a:buChar char="•"/>
             </a:pPr>
             <a:r>
               <a:rPr lang="en-US" sz="2400" dirty="0">
@@ -5145,7 +5192,39 @@
                   <a:lin ang="5400000" scaled="0"/>
                 </a:gradFill>
               </a:rPr>
-              <a:t>Find virtual user groups happening around the globe!</a:t>
+              <a:t>Find </a:t>
+            </a:r>
+            <a:r>
+              <a:rPr lang="en-US" sz="2400" dirty="0" smtClean="0">
+                <a:gradFill>
+                  <a:gsLst>
+                    <a:gs pos="2917">
+                      <a:schemeClr val="tx1"/>
+                    </a:gs>
+                    <a:gs pos="30000">
+                      <a:schemeClr val="tx1"/>
+                    </a:gs>
+                  </a:gsLst>
+                  <a:lin ang="5400000" scaled="0"/>
+                </a:gradFill>
+              </a:rPr>
+              <a:t>virtual .NET events happening around </a:t>
+            </a:r>
+            <a:r>
+              <a:rPr lang="en-US" sz="2400" dirty="0">
+                <a:gradFill>
+                  <a:gsLst>
+                    <a:gs pos="2917">
+                      <a:schemeClr val="tx1"/>
+                    </a:gs>
+                    <a:gs pos="30000">
+                      <a:schemeClr val="tx1"/>
+                    </a:gs>
+                  </a:gsLst>
+                  <a:lin ang="5400000" scaled="0"/>
+                </a:gradFill>
+              </a:rPr>
+              <a:t>the globe!</a:t>
             </a:r>
           </a:p>
         </p:txBody>
@@ -5163,6 +5242,13 @@
   <p:transition>
     <p:fade/>
   </p:transition>
+  <p:timing>
+    <p:tnLst>
+      <p:par>
+        <p:cTn id="1" dur="indefinite" restart="never" nodeType="tmRoot"/>
+      </p:par>
+    </p:tnLst>
+  </p:timing>
 </p:sld>
 </file>
 
@@ -5945,8 +6031,15 @@
 <file path=customXml/itemProps3.xml><?xml version="1.0" encoding="utf-8"?>
 <ds:datastoreItem xmlns:ds="http://schemas.openxmlformats.org/officeDocument/2006/customXml" ds:itemID="{D23E43D6-DB2F-4C33-A8C8-D28F777A5DE7}">
   <ds:schemaRefs>
+    <ds:schemaRef ds:uri="http://purl.org/dc/terms/"/>
+    <ds:schemaRef ds:uri="http://schemas.openxmlformats.org/package/2006/metadata/core-properties"/>
+    <ds:schemaRef ds:uri="http://schemas.microsoft.com/office/2006/documentManagement/types"/>
+    <ds:schemaRef ds:uri="http://schemas.microsoft.com/office/infopath/2007/PartnerControls"/>
+    <ds:schemaRef ds:uri="http://purl.org/dc/elements/1.1/"/>
     <ds:schemaRef ds:uri="http://schemas.microsoft.com/office/2006/metadata/properties"/>
-    <ds:schemaRef ds:uri="http://schemas.microsoft.com/office/infopath/2007/PartnerControls"/>
+    <ds:schemaRef ds:uri="6cc4f3bd-4402-4735-afb1-c6af653bc110"/>
+    <ds:schemaRef ds:uri="http://www.w3.org/XML/1998/namespace"/>
+    <ds:schemaRef ds:uri="http://purl.org/dc/dcmitype/"/>
   </ds:schemaRefs>
 </ds:datastoreItem>
 </file>
</xml_diff>

<commit_message>
Updating .net foundation promotion slides for virtual user group (#59)
</commit_message>
<xml_diff>
--- a/virtual_meetup/Virtual.User.Group.Slides.pptx
+++ b/virtual_meetup/Virtual.User.Group.Slides.pptx
@@ -216,7 +216,7 @@
           <a:p>
             <a:fld id="{18438622-0837-4E9E-A16C-0B0206CE676E}" type="datetimeFigureOut">
               <a:rPr lang="en-US" smtClean="0"/>
-              <a:t>6/15/2020</a:t>
+              <a:t>2/15/2022</a:t>
             </a:fld>
             <a:endParaRPr lang="en-US"/>
           </a:p>
@@ -527,7 +527,7 @@
           <a:bodyPr/>
           <a:lstStyle/>
           <a:p>
-            <a:endParaRPr lang="en-US"/>
+            <a:endParaRPr lang="en-US" dirty="0"/>
           </a:p>
         </p:txBody>
       </p:sp>
@@ -1354,7 +1354,7 @@
           <a:p>
             <a:fld id="{2CB4FCFF-7E08-4891-89FE-DF4B4567C4DE}" type="datetimeFigureOut">
               <a:rPr lang="en-US" smtClean="0"/>
-              <a:t>6/15/2020</a:t>
+              <a:t>2/15/2022</a:t>
             </a:fld>
             <a:endParaRPr lang="en-US"/>
           </a:p>
@@ -4890,6 +4890,13 @@
   <p:transition>
     <p:fade/>
   </p:transition>
+  <p:timing>
+    <p:tnLst>
+      <p:par>
+        <p:cTn id="1" dur="indefinite" restart="never" nodeType="tmRoot"/>
+      </p:par>
+    </p:tnLst>
+  </p:timing>
 </p:sld>
 </file>
 
@@ -4926,11 +4933,17 @@
             <p:ph type="title"/>
           </p:nvPr>
         </p:nvSpPr>
-        <p:spPr/>
+        <p:spPr>
+          <a:xfrm>
+            <a:off x="1628140" y="230376"/>
+            <a:ext cx="8976360" cy="899665"/>
+          </a:xfrm>
+        </p:spPr>
         <p:txBody>
           <a:bodyPr/>
           <a:lstStyle/>
           <a:p>
+            <a:pPr algn="ctr"/>
             <a:r>
               <a:rPr lang="en-US" dirty="0"/>
               <a:t>.NET Foundation Virtual User Group</a:t>
@@ -4983,119 +4996,155 @@
           </a:p>
         </p:txBody>
       </p:sp>
-      <p:grpSp>
-        <p:nvGrpSpPr>
-          <p:cNvPr id="11" name="Group 10">
+      <p:sp>
+        <p:nvSpPr>
+          <p:cNvPr id="9" name="TextBox 8">
             <a:extLst>
               <a:ext uri="{FF2B5EF4-FFF2-40B4-BE49-F238E27FC236}">
-                <a16:creationId xmlns:a16="http://schemas.microsoft.com/office/drawing/2014/main" id="{B210E1BE-6F7F-4D04-A5CC-45EB96F80AF7}"/>
+                <a16:creationId xmlns:a16="http://schemas.microsoft.com/office/drawing/2014/main" id="{06D0076F-A3C2-49BC-AD15-176C795D910B}"/>
               </a:ext>
             </a:extLst>
           </p:cNvPr>
-          <p:cNvGrpSpPr/>
+          <p:cNvSpPr txBox="1"/>
           <p:nvPr/>
-        </p:nvGrpSpPr>
-        <p:grpSpPr>
+        </p:nvSpPr>
+        <p:spPr>
           <a:xfrm>
-            <a:off x="2165722" y="2207172"/>
-            <a:ext cx="9464670" cy="4007724"/>
-            <a:chOff x="392256" y="1313872"/>
-            <a:chExt cx="7890732" cy="3341255"/>
+            <a:off x="6590581" y="5149644"/>
+            <a:ext cx="5516534" cy="461665"/>
           </a:xfrm>
-        </p:grpSpPr>
-        <p:pic>
-          <p:nvPicPr>
-            <p:cNvPr id="7" name="Picture 6">
-              <a:extLst>
-                <a:ext uri="{FF2B5EF4-FFF2-40B4-BE49-F238E27FC236}">
-                  <a16:creationId xmlns:a16="http://schemas.microsoft.com/office/drawing/2014/main" id="{F61C6565-4685-48C8-9C43-B8A4E6C34926}"/>
-                </a:ext>
-              </a:extLst>
-            </p:cNvPr>
-            <p:cNvPicPr>
-              <a:picLocks noChangeAspect="1"/>
-            </p:cNvPicPr>
-            <p:nvPr/>
-          </p:nvPicPr>
-          <p:blipFill>
-            <a:blip r:embed="rId3"/>
-            <a:stretch>
-              <a:fillRect/>
-            </a:stretch>
-          </p:blipFill>
-          <p:spPr>
-            <a:xfrm>
-              <a:off x="392256" y="1313872"/>
-              <a:ext cx="7890732" cy="3341255"/>
-            </a:xfrm>
-            <a:prstGeom prst="rect">
-              <a:avLst/>
-            </a:prstGeom>
-            <a:ln w="19050">
+          <a:prstGeom prst="rect">
+            <a:avLst/>
+          </a:prstGeom>
+          <a:solidFill>
+            <a:schemeClr val="tx2"/>
+          </a:solidFill>
+          <a:ln>
+            <a:solidFill>
+              <a:schemeClr val="bg1"/>
+            </a:solidFill>
+          </a:ln>
+        </p:spPr>
+        <p:txBody>
+          <a:bodyPr wrap="square">
+            <a:spAutoFit/>
+          </a:bodyPr>
+          <a:lstStyle/>
+          <a:p>
+            <a:pPr algn="ctr"/>
+            <a:r>
+              <a:rPr lang="en-US" sz="2400" dirty="0">
+                <a:solidFill>
+                  <a:schemeClr val="bg1"/>
+                </a:solidFill>
+              </a:rPr>
+              <a:t>meetup.com/</a:t>
+            </a:r>
+            <a:r>
+              <a:rPr lang="en-US" sz="2400" dirty="0" err="1">
+                <a:solidFill>
+                  <a:schemeClr val="bg1"/>
+                </a:solidFill>
+              </a:rPr>
+              <a:t>dotnet</a:t>
+            </a:r>
+            <a:r>
+              <a:rPr lang="en-US" sz="2400" dirty="0">
+                <a:solidFill>
+                  <a:schemeClr val="bg1"/>
+                </a:solidFill>
+              </a:rPr>
+              <a:t>-virtual-user-group</a:t>
+            </a:r>
+            <a:endParaRPr lang="en-US" sz="2400" dirty="0">
               <a:solidFill>
-                <a:schemeClr val="accent1">
-                  <a:lumMod val="20000"/>
-                  <a:lumOff val="80000"/>
-                </a:schemeClr>
+                <a:schemeClr val="bg1"/>
               </a:solidFill>
-            </a:ln>
-          </p:spPr>
-        </p:pic>
-        <p:sp>
-          <p:nvSpPr>
-            <p:cNvPr id="9" name="TextBox 8">
-              <a:extLst>
-                <a:ext uri="{FF2B5EF4-FFF2-40B4-BE49-F238E27FC236}">
-                  <a16:creationId xmlns:a16="http://schemas.microsoft.com/office/drawing/2014/main" id="{06D0076F-A3C2-49BC-AD15-176C795D910B}"/>
-                </a:ext>
-              </a:extLst>
-            </p:cNvPr>
-            <p:cNvSpPr txBox="1"/>
-            <p:nvPr/>
-          </p:nvSpPr>
-          <p:spPr>
-            <a:xfrm>
-              <a:off x="3432356" y="3837229"/>
-              <a:ext cx="4783546" cy="384892"/>
-            </a:xfrm>
-            <a:prstGeom prst="rect">
-              <a:avLst/>
-            </a:prstGeom>
-            <a:solidFill>
-              <a:schemeClr val="accent1">
-                <a:lumMod val="20000"/>
-                <a:lumOff val="80000"/>
-              </a:schemeClr>
-            </a:solidFill>
-            <a:ln>
-              <a:solidFill>
-                <a:schemeClr val="accent1">
-                  <a:lumMod val="20000"/>
-                  <a:lumOff val="80000"/>
-                </a:schemeClr>
-              </a:solidFill>
-            </a:ln>
-          </p:spPr>
-          <p:txBody>
-            <a:bodyPr wrap="square">
-              <a:spAutoFit/>
-            </a:bodyPr>
-            <a:lstStyle/>
-            <a:p>
-              <a:r>
-                <a:rPr lang="en-US" sz="2400" dirty="0">
-                  <a:hlinkClick r:id="rId4"/>
-                </a:rPr>
-                <a:t>meetup.com/dotnet-virtual-user-group</a:t>
-              </a:r>
-              <a:endParaRPr lang="en-US" sz="2400" dirty="0"/>
-            </a:p>
-          </p:txBody>
-        </p:sp>
-      </p:grpSp>
+            </a:endParaRPr>
+          </a:p>
+        </p:txBody>
+      </p:sp>
+      <p:pic>
+        <p:nvPicPr>
+          <p:cNvPr id="6" name="Picture 5"/>
+          <p:cNvPicPr>
+            <a:picLocks noChangeAspect="1"/>
+          </p:cNvPicPr>
+          <p:nvPr/>
+        </p:nvPicPr>
+        <p:blipFill>
+          <a:blip r:embed="rId3" cstate="hqprint">
+            <a:extLst>
+              <a:ext uri="{28A0092B-C50C-407E-A947-70E740481C1C}">
+                <a14:useLocalDpi xmlns:a14="http://schemas.microsoft.com/office/drawing/2010/main" val="0"/>
+              </a:ext>
+            </a:extLst>
+          </a:blip>
+          <a:stretch>
+            <a:fillRect/>
+          </a:stretch>
+        </p:blipFill>
+        <p:spPr>
+          <a:xfrm>
+            <a:off x="8073551" y="2147974"/>
+            <a:ext cx="2280295" cy="2280295"/>
+          </a:xfrm>
+          <a:prstGeom prst="rect">
+            <a:avLst/>
+          </a:prstGeom>
+        </p:spPr>
+      </p:pic>
+      <p:pic>
+        <p:nvPicPr>
+          <p:cNvPr id="8" name="Picture 7"/>
+          <p:cNvPicPr>
+            <a:picLocks noChangeAspect="1"/>
+          </p:cNvPicPr>
+          <p:nvPr/>
+        </p:nvPicPr>
+        <p:blipFill>
+          <a:blip r:embed="rId4"/>
+          <a:stretch>
+            <a:fillRect/>
+          </a:stretch>
+        </p:blipFill>
+        <p:spPr>
+          <a:xfrm>
+            <a:off x="269240" y="1528257"/>
+            <a:ext cx="6134100" cy="5105400"/>
+          </a:xfrm>
+          <a:prstGeom prst="rect">
+            <a:avLst/>
+          </a:prstGeom>
+        </p:spPr>
+      </p:pic>
+      <p:pic>
+        <p:nvPicPr>
+          <p:cNvPr id="12" name="Picture 11"/>
+          <p:cNvPicPr>
+            <a:picLocks noChangeAspect="1"/>
+          </p:cNvPicPr>
+          <p:nvPr/>
+        </p:nvPicPr>
+        <p:blipFill>
+          <a:blip r:embed="rId5"/>
+          <a:stretch>
+            <a:fillRect/>
+          </a:stretch>
+        </p:blipFill>
+        <p:spPr>
+          <a:xfrm>
+            <a:off x="269240" y="1087254"/>
+            <a:ext cx="1247775" cy="542925"/>
+          </a:xfrm>
+          <a:prstGeom prst="rect">
+            <a:avLst/>
+          </a:prstGeom>
+        </p:spPr>
+      </p:pic>
       <p:sp>
         <p:nvSpPr>
-          <p:cNvPr id="10" name="TextBox 9">
+          <p:cNvPr id="13" name="TextBox 12">
             <a:extLst>
               <a:ext uri="{FF2B5EF4-FFF2-40B4-BE49-F238E27FC236}">
                 <a16:creationId xmlns:a16="http://schemas.microsoft.com/office/drawing/2014/main" id="{EA8FF4D3-8DA1-4A35-AF03-59E63C839C0B}"/>
@@ -5107,8 +5156,8 @@
         </p:nvSpPr>
         <p:spPr>
           <a:xfrm>
-            <a:off x="291500" y="1428109"/>
-            <a:ext cx="9230871" cy="627864"/>
+            <a:off x="2239792" y="875243"/>
+            <a:ext cx="7753055" cy="627864"/>
           </a:xfrm>
           <a:prstGeom prst="rect">
             <a:avLst/>
@@ -5121,15 +5170,13 @@
           </a:bodyPr>
           <a:lstStyle/>
           <a:p>
-            <a:pPr marL="342900" indent="-342900">
+            <a:pPr algn="ctr">
               <a:lnSpc>
                 <a:spcPct val="90000"/>
               </a:lnSpc>
               <a:spcAft>
                 <a:spcPts val="600"/>
               </a:spcAft>
-              <a:buFont typeface="Arial" panose="020B0604020202020204" pitchFamily="34" charset="0"/>
-              <a:buChar char="•"/>
             </a:pPr>
             <a:r>
               <a:rPr lang="en-US" sz="2400" dirty="0">
@@ -5145,7 +5192,39 @@
                   <a:lin ang="5400000" scaled="0"/>
                 </a:gradFill>
               </a:rPr>
-              <a:t>Find virtual user groups happening around the globe!</a:t>
+              <a:t>Find </a:t>
+            </a:r>
+            <a:r>
+              <a:rPr lang="en-US" sz="2400" dirty="0" smtClean="0">
+                <a:gradFill>
+                  <a:gsLst>
+                    <a:gs pos="2917">
+                      <a:schemeClr val="tx1"/>
+                    </a:gs>
+                    <a:gs pos="30000">
+                      <a:schemeClr val="tx1"/>
+                    </a:gs>
+                  </a:gsLst>
+                  <a:lin ang="5400000" scaled="0"/>
+                </a:gradFill>
+              </a:rPr>
+              <a:t>virtual .NET events happening around </a:t>
+            </a:r>
+            <a:r>
+              <a:rPr lang="en-US" sz="2400" dirty="0">
+                <a:gradFill>
+                  <a:gsLst>
+                    <a:gs pos="2917">
+                      <a:schemeClr val="tx1"/>
+                    </a:gs>
+                    <a:gs pos="30000">
+                      <a:schemeClr val="tx1"/>
+                    </a:gs>
+                  </a:gsLst>
+                  <a:lin ang="5400000" scaled="0"/>
+                </a:gradFill>
+              </a:rPr>
+              <a:t>the globe!</a:t>
             </a:r>
           </a:p>
         </p:txBody>
@@ -5163,6 +5242,13 @@
   <p:transition>
     <p:fade/>
   </p:transition>
+  <p:timing>
+    <p:tnLst>
+      <p:par>
+        <p:cTn id="1" dur="indefinite" restart="never" nodeType="tmRoot"/>
+      </p:par>
+    </p:tnLst>
+  </p:timing>
 </p:sld>
 </file>
 
@@ -5945,8 +6031,15 @@
 <file path=customXml/itemProps3.xml><?xml version="1.0" encoding="utf-8"?>
 <ds:datastoreItem xmlns:ds="http://schemas.openxmlformats.org/officeDocument/2006/customXml" ds:itemID="{D23E43D6-DB2F-4C33-A8C8-D28F777A5DE7}">
   <ds:schemaRefs>
+    <ds:schemaRef ds:uri="http://purl.org/dc/terms/"/>
+    <ds:schemaRef ds:uri="http://schemas.openxmlformats.org/package/2006/metadata/core-properties"/>
+    <ds:schemaRef ds:uri="http://schemas.microsoft.com/office/2006/documentManagement/types"/>
+    <ds:schemaRef ds:uri="http://schemas.microsoft.com/office/infopath/2007/PartnerControls"/>
+    <ds:schemaRef ds:uri="http://purl.org/dc/elements/1.1/"/>
     <ds:schemaRef ds:uri="http://schemas.microsoft.com/office/2006/metadata/properties"/>
-    <ds:schemaRef ds:uri="http://schemas.microsoft.com/office/infopath/2007/PartnerControls"/>
+    <ds:schemaRef ds:uri="6cc4f3bd-4402-4735-afb1-c6af653bc110"/>
+    <ds:schemaRef ds:uri="http://www.w3.org/XML/1998/namespace"/>
+    <ds:schemaRef ds:uri="http://purl.org/dc/dcmitype/"/>
   </ds:schemaRefs>
 </ds:datastoreItem>
 </file>
</xml_diff>